<commit_message>
Update Column DB Image
</commit_message>
<xml_diff>
--- a/images/theory_analysis/NoSQL_Column-oriented_Column_Family_DB/NoSQL_Column-oriented_Column_Family_DB.pptx
+++ b/images/theory_analysis/NoSQL_Column-oriented_Column_Family_DB/NoSQL_Column-oriented_Column_Family_DB.pptx
@@ -3574,7 +3574,7 @@
         </p:nvSpPr>
         <p:spPr>
           <a:xfrm>
-            <a:off x="457200" y="-92546"/>
+            <a:off x="457200" y="-164554"/>
             <a:ext cx="8229600" cy="857250"/>
           </a:xfrm>
         </p:spPr>
@@ -3599,13 +3599,13 @@
           <p:nvPr>
             <p:extLst>
               <p:ext uri="{D42A27DB-BD31-4B8C-83A1-F6EECF244321}">
-                <p14:modId xmlns:p14="http://schemas.microsoft.com/office/powerpoint/2010/main" val="269994715"/>
+                <p14:modId xmlns:p14="http://schemas.microsoft.com/office/powerpoint/2010/main" val="1094087553"/>
               </p:ext>
             </p:extLst>
           </p:nvPr>
         </p:nvGraphicFramePr>
         <p:xfrm>
-          <a:off x="395536" y="2211710"/>
+          <a:off x="395536" y="2139702"/>
           <a:ext cx="936104" cy="1425155"/>
         </p:xfrm>
         <a:graphic>
@@ -3750,13 +3750,13 @@
           <p:nvPr>
             <p:extLst>
               <p:ext uri="{D42A27DB-BD31-4B8C-83A1-F6EECF244321}">
-                <p14:modId xmlns:p14="http://schemas.microsoft.com/office/powerpoint/2010/main" val="1507683838"/>
+                <p14:modId xmlns:p14="http://schemas.microsoft.com/office/powerpoint/2010/main" val="1585477405"/>
               </p:ext>
             </p:extLst>
           </p:nvPr>
         </p:nvGraphicFramePr>
         <p:xfrm>
-          <a:off x="1331640" y="2211710"/>
+          <a:off x="1331640" y="2139702"/>
           <a:ext cx="936104" cy="1425155"/>
         </p:xfrm>
         <a:graphic>
@@ -3897,13 +3897,13 @@
           <p:nvPr>
             <p:extLst>
               <p:ext uri="{D42A27DB-BD31-4B8C-83A1-F6EECF244321}">
-                <p14:modId xmlns:p14="http://schemas.microsoft.com/office/powerpoint/2010/main" val="1501853884"/>
+                <p14:modId xmlns:p14="http://schemas.microsoft.com/office/powerpoint/2010/main" val="2254768062"/>
               </p:ext>
             </p:extLst>
           </p:nvPr>
         </p:nvGraphicFramePr>
         <p:xfrm>
-          <a:off x="2267744" y="2211710"/>
+          <a:off x="2267744" y="2139702"/>
           <a:ext cx="1008112" cy="1425155"/>
         </p:xfrm>
         <a:graphic>
@@ -4056,13 +4056,13 @@
           <p:nvPr>
             <p:extLst>
               <p:ext uri="{D42A27DB-BD31-4B8C-83A1-F6EECF244321}">
-                <p14:modId xmlns:p14="http://schemas.microsoft.com/office/powerpoint/2010/main" val="4153506716"/>
+                <p14:modId xmlns:p14="http://schemas.microsoft.com/office/powerpoint/2010/main" val="3972763097"/>
               </p:ext>
             </p:extLst>
           </p:nvPr>
         </p:nvGraphicFramePr>
         <p:xfrm>
-          <a:off x="3275856" y="2211710"/>
+          <a:off x="3275856" y="2139702"/>
           <a:ext cx="720080" cy="1425155"/>
         </p:xfrm>
         <a:graphic>
@@ -4202,7 +4202,7 @@
         </p:nvSpPr>
         <p:spPr>
           <a:xfrm>
-            <a:off x="4355976" y="699542"/>
+            <a:off x="4355976" y="627534"/>
             <a:ext cx="4320480" cy="2160240"/>
           </a:xfrm>
           <a:prstGeom prst="can">
@@ -4244,13 +4244,13 @@
           <p:nvPr>
             <p:extLst>
               <p:ext uri="{D42A27DB-BD31-4B8C-83A1-F6EECF244321}">
-                <p14:modId xmlns:p14="http://schemas.microsoft.com/office/powerpoint/2010/main" val="2960107577"/>
+                <p14:modId xmlns:p14="http://schemas.microsoft.com/office/powerpoint/2010/main" val="1258108324"/>
               </p:ext>
             </p:extLst>
           </p:nvPr>
         </p:nvGraphicFramePr>
         <p:xfrm>
-          <a:off x="5076056" y="1059582"/>
+          <a:off x="5076056" y="987574"/>
           <a:ext cx="3456384" cy="288032"/>
         </p:xfrm>
         <a:graphic>
@@ -4369,13 +4369,13 @@
           <p:nvPr>
             <p:extLst>
               <p:ext uri="{D42A27DB-BD31-4B8C-83A1-F6EECF244321}">
-                <p14:modId xmlns:p14="http://schemas.microsoft.com/office/powerpoint/2010/main" val="2195759403"/>
+                <p14:modId xmlns:p14="http://schemas.microsoft.com/office/powerpoint/2010/main" val="2072778566"/>
               </p:ext>
             </p:extLst>
           </p:nvPr>
         </p:nvGraphicFramePr>
         <p:xfrm>
-          <a:off x="5076056" y="1491630"/>
+          <a:off x="5076056" y="1419622"/>
           <a:ext cx="3456384" cy="288032"/>
         </p:xfrm>
         <a:graphic>
@@ -4498,13 +4498,13 @@
           <p:nvPr>
             <p:extLst>
               <p:ext uri="{D42A27DB-BD31-4B8C-83A1-F6EECF244321}">
-                <p14:modId xmlns:p14="http://schemas.microsoft.com/office/powerpoint/2010/main" val="1860595820"/>
+                <p14:modId xmlns:p14="http://schemas.microsoft.com/office/powerpoint/2010/main" val="2673968612"/>
               </p:ext>
             </p:extLst>
           </p:nvPr>
         </p:nvGraphicFramePr>
         <p:xfrm>
-          <a:off x="5076056" y="1923678"/>
+          <a:off x="5076056" y="1851670"/>
           <a:ext cx="3456384" cy="288032"/>
         </p:xfrm>
         <a:graphic>
@@ -4626,7 +4626,7 @@
         </p:nvSpPr>
         <p:spPr>
           <a:xfrm>
-            <a:off x="4242850" y="1074971"/>
+            <a:off x="4242850" y="1002963"/>
             <a:ext cx="936104" cy="276999"/>
           </a:xfrm>
           <a:prstGeom prst="rect">
@@ -4657,7 +4657,7 @@
         </p:nvSpPr>
         <p:spPr>
           <a:xfrm>
-            <a:off x="4242850" y="1491630"/>
+            <a:off x="4242850" y="1419622"/>
             <a:ext cx="936104" cy="276999"/>
           </a:xfrm>
           <a:prstGeom prst="rect">
@@ -4688,7 +4688,7 @@
         </p:nvSpPr>
         <p:spPr>
           <a:xfrm>
-            <a:off x="4242850" y="1923678"/>
+            <a:off x="4242850" y="1851670"/>
             <a:ext cx="936104" cy="276999"/>
           </a:xfrm>
           <a:prstGeom prst="rect">
@@ -4720,13 +4720,13 @@
           <p:nvPr>
             <p:extLst>
               <p:ext uri="{D42A27DB-BD31-4B8C-83A1-F6EECF244321}">
-                <p14:modId xmlns:p14="http://schemas.microsoft.com/office/powerpoint/2010/main" val="1551148028"/>
+                <p14:modId xmlns:p14="http://schemas.microsoft.com/office/powerpoint/2010/main" val="3704113779"/>
               </p:ext>
             </p:extLst>
           </p:nvPr>
         </p:nvGraphicFramePr>
         <p:xfrm>
-          <a:off x="5076056" y="2355726"/>
+          <a:off x="5076056" y="2283718"/>
           <a:ext cx="3456384" cy="288032"/>
         </p:xfrm>
         <a:graphic>
@@ -4844,7 +4844,7 @@
         </p:nvSpPr>
         <p:spPr>
           <a:xfrm>
-            <a:off x="4242850" y="2355726"/>
+            <a:off x="4242850" y="2283718"/>
             <a:ext cx="936104" cy="276999"/>
           </a:xfrm>
           <a:prstGeom prst="rect">
@@ -4875,7 +4875,7 @@
         </p:nvSpPr>
         <p:spPr>
           <a:xfrm>
-            <a:off x="4355976" y="2931790"/>
+            <a:off x="4355976" y="2859782"/>
             <a:ext cx="4320480" cy="2160240"/>
           </a:xfrm>
           <a:prstGeom prst="can">
@@ -4917,13 +4917,13 @@
           <p:nvPr>
             <p:extLst>
               <p:ext uri="{D42A27DB-BD31-4B8C-83A1-F6EECF244321}">
-                <p14:modId xmlns:p14="http://schemas.microsoft.com/office/powerpoint/2010/main" val="3232316693"/>
+                <p14:modId xmlns:p14="http://schemas.microsoft.com/office/powerpoint/2010/main" val="925101393"/>
               </p:ext>
             </p:extLst>
           </p:nvPr>
         </p:nvGraphicFramePr>
         <p:xfrm>
-          <a:off x="5076056" y="3291830"/>
+          <a:off x="5076056" y="3219822"/>
           <a:ext cx="3456384" cy="288032"/>
         </p:xfrm>
         <a:graphic>
@@ -5042,13 +5042,13 @@
           <p:nvPr>
             <p:extLst>
               <p:ext uri="{D42A27DB-BD31-4B8C-83A1-F6EECF244321}">
-                <p14:modId xmlns:p14="http://schemas.microsoft.com/office/powerpoint/2010/main" val="3470930751"/>
+                <p14:modId xmlns:p14="http://schemas.microsoft.com/office/powerpoint/2010/main" val="1765873950"/>
               </p:ext>
             </p:extLst>
           </p:nvPr>
         </p:nvGraphicFramePr>
         <p:xfrm>
-          <a:off x="5076056" y="3723878"/>
+          <a:off x="5076056" y="3651870"/>
           <a:ext cx="3456384" cy="288032"/>
         </p:xfrm>
         <a:graphic>
@@ -5251,13 +5251,13 @@
           <p:nvPr>
             <p:extLst>
               <p:ext uri="{D42A27DB-BD31-4B8C-83A1-F6EECF244321}">
-                <p14:modId xmlns:p14="http://schemas.microsoft.com/office/powerpoint/2010/main" val="2899458077"/>
+                <p14:modId xmlns:p14="http://schemas.microsoft.com/office/powerpoint/2010/main" val="1464337934"/>
               </p:ext>
             </p:extLst>
           </p:nvPr>
         </p:nvGraphicFramePr>
         <p:xfrm>
-          <a:off x="5076056" y="4155926"/>
+          <a:off x="5076056" y="4083918"/>
           <a:ext cx="3456384" cy="288032"/>
         </p:xfrm>
         <a:graphic>
@@ -5383,7 +5383,7 @@
         </p:nvSpPr>
         <p:spPr>
           <a:xfrm>
-            <a:off x="4242850" y="3307219"/>
+            <a:off x="4242850" y="3235211"/>
             <a:ext cx="936104" cy="276999"/>
           </a:xfrm>
           <a:prstGeom prst="rect">
@@ -5414,7 +5414,7 @@
         </p:nvSpPr>
         <p:spPr>
           <a:xfrm>
-            <a:off x="4242850" y="3723878"/>
+            <a:off x="4242850" y="3651870"/>
             <a:ext cx="936104" cy="276999"/>
           </a:xfrm>
           <a:prstGeom prst="rect">
@@ -5445,7 +5445,7 @@
         </p:nvSpPr>
         <p:spPr>
           <a:xfrm>
-            <a:off x="4242850" y="4155926"/>
+            <a:off x="4242850" y="4083918"/>
             <a:ext cx="936104" cy="276999"/>
           </a:xfrm>
           <a:prstGeom prst="rect">
@@ -5477,13 +5477,13 @@
           <p:nvPr>
             <p:extLst>
               <p:ext uri="{D42A27DB-BD31-4B8C-83A1-F6EECF244321}">
-                <p14:modId xmlns:p14="http://schemas.microsoft.com/office/powerpoint/2010/main" val="671549206"/>
+                <p14:modId xmlns:p14="http://schemas.microsoft.com/office/powerpoint/2010/main" val="1549800243"/>
               </p:ext>
             </p:extLst>
           </p:nvPr>
         </p:nvGraphicFramePr>
         <p:xfrm>
-          <a:off x="5076056" y="4587974"/>
+          <a:off x="5076056" y="4515966"/>
           <a:ext cx="3456384" cy="288032"/>
         </p:xfrm>
         <a:graphic>
@@ -5601,7 +5601,7 @@
         </p:nvSpPr>
         <p:spPr>
           <a:xfrm>
-            <a:off x="4242850" y="4587974"/>
+            <a:off x="4242850" y="4515966"/>
             <a:ext cx="936104" cy="276999"/>
           </a:xfrm>
           <a:prstGeom prst="rect">
@@ -5641,7 +5641,7 @@
         </p:nvCxnSpPr>
         <p:spPr>
           <a:xfrm flipV="1">
-            <a:off x="2267744" y="1779662"/>
+            <a:off x="2267744" y="1707654"/>
             <a:ext cx="2088232" cy="432048"/>
           </a:xfrm>
           <a:prstGeom prst="straightConnector1">
@@ -5687,7 +5687,7 @@
         </p:nvCxnSpPr>
         <p:spPr>
           <a:xfrm>
-            <a:off x="2267744" y="3636865"/>
+            <a:off x="2267744" y="3564857"/>
             <a:ext cx="2088232" cy="375045"/>
           </a:xfrm>
           <a:prstGeom prst="straightConnector1">
@@ -5730,7 +5730,7 @@
         </p:nvSpPr>
         <p:spPr>
           <a:xfrm>
-            <a:off x="2483768" y="1635646"/>
+            <a:off x="2483768" y="1563638"/>
             <a:ext cx="1343381" cy="307777"/>
           </a:xfrm>
           <a:prstGeom prst="rect">
@@ -5766,7 +5766,7 @@
         </p:nvSpPr>
         <p:spPr>
           <a:xfrm>
-            <a:off x="2339752" y="3867217"/>
+            <a:off x="2339752" y="3795209"/>
             <a:ext cx="1636858" cy="307777"/>
           </a:xfrm>
           <a:prstGeom prst="rect">

</xml_diff>